<commit_message>
Updated links on software testing slides
</commit_message>
<xml_diff>
--- a/Slides/Software Testing.pptx
+++ b/Slides/Software Testing.pptx
@@ -161,10 +161,9 @@
           </a:lstStyle>
           <a:p>
             <a:r>
-              <a:rPr lang="en-US" smtClean="0"/>
+              <a:rPr lang="en-US"/>
               <a:t>Click to edit Master title style</a:t>
             </a:r>
-            <a:endParaRPr lang="en-US"/>
           </a:p>
         </p:txBody>
       </p:sp>
@@ -226,10 +225,9 @@
           </a:lstStyle>
           <a:p>
             <a:r>
-              <a:rPr lang="en-US" smtClean="0"/>
+              <a:rPr lang="en-US"/>
               <a:t>Click to edit Master subtitle style</a:t>
             </a:r>
-            <a:endParaRPr lang="en-US"/>
           </a:p>
         </p:txBody>
       </p:sp>
@@ -250,7 +248,7 @@
           <a:p>
             <a:fld id="{CBB88EEF-5DB1-4173-B392-01603F646A9C}" type="datetimeFigureOut">
               <a:rPr lang="en-US" smtClean="0"/>
-              <a:t>9/27/2018</a:t>
+              <a:t>10/6/2024</a:t>
             </a:fld>
             <a:endParaRPr lang="en-US"/>
           </a:p>
@@ -344,10 +342,9 @@
           <a:lstStyle/>
           <a:p>
             <a:r>
-              <a:rPr lang="en-US" smtClean="0"/>
+              <a:rPr lang="en-US"/>
               <a:t>Click to edit Master title style</a:t>
             </a:r>
-            <a:endParaRPr lang="en-US"/>
           </a:p>
         </p:txBody>
       </p:sp>
@@ -368,38 +365,37 @@
           <a:p>
             <a:pPr lvl="0"/>
             <a:r>
-              <a:rPr lang="en-US" smtClean="0"/>
+              <a:rPr lang="en-US"/>
               <a:t>Click to edit Master text styles</a:t>
             </a:r>
           </a:p>
           <a:p>
             <a:pPr lvl="1"/>
             <a:r>
-              <a:rPr lang="en-US" smtClean="0"/>
+              <a:rPr lang="en-US"/>
               <a:t>Second level</a:t>
             </a:r>
           </a:p>
           <a:p>
             <a:pPr lvl="2"/>
             <a:r>
-              <a:rPr lang="en-US" smtClean="0"/>
+              <a:rPr lang="en-US"/>
               <a:t>Third level</a:t>
             </a:r>
           </a:p>
           <a:p>
             <a:pPr lvl="3"/>
             <a:r>
-              <a:rPr lang="en-US" smtClean="0"/>
+              <a:rPr lang="en-US"/>
               <a:t>Fourth level</a:t>
             </a:r>
           </a:p>
           <a:p>
             <a:pPr lvl="4"/>
             <a:r>
-              <a:rPr lang="en-US" smtClean="0"/>
+              <a:rPr lang="en-US"/>
               <a:t>Fifth level</a:t>
             </a:r>
-            <a:endParaRPr lang="en-US"/>
           </a:p>
         </p:txBody>
       </p:sp>
@@ -420,7 +416,7 @@
           <a:p>
             <a:fld id="{CBB88EEF-5DB1-4173-B392-01603F646A9C}" type="datetimeFigureOut">
               <a:rPr lang="en-US" smtClean="0"/>
-              <a:t>9/27/2018</a:t>
+              <a:t>10/6/2024</a:t>
             </a:fld>
             <a:endParaRPr lang="en-US"/>
           </a:p>
@@ -519,10 +515,9 @@
           <a:lstStyle/>
           <a:p>
             <a:r>
-              <a:rPr lang="en-US" smtClean="0"/>
+              <a:rPr lang="en-US"/>
               <a:t>Click to edit Master title style</a:t>
             </a:r>
-            <a:endParaRPr lang="en-US"/>
           </a:p>
         </p:txBody>
       </p:sp>
@@ -548,38 +543,37 @@
           <a:p>
             <a:pPr lvl="0"/>
             <a:r>
-              <a:rPr lang="en-US" smtClean="0"/>
+              <a:rPr lang="en-US"/>
               <a:t>Click to edit Master text styles</a:t>
             </a:r>
           </a:p>
           <a:p>
             <a:pPr lvl="1"/>
             <a:r>
-              <a:rPr lang="en-US" smtClean="0"/>
+              <a:rPr lang="en-US"/>
               <a:t>Second level</a:t>
             </a:r>
           </a:p>
           <a:p>
             <a:pPr lvl="2"/>
             <a:r>
-              <a:rPr lang="en-US" smtClean="0"/>
+              <a:rPr lang="en-US"/>
               <a:t>Third level</a:t>
             </a:r>
           </a:p>
           <a:p>
             <a:pPr lvl="3"/>
             <a:r>
-              <a:rPr lang="en-US" smtClean="0"/>
+              <a:rPr lang="en-US"/>
               <a:t>Fourth level</a:t>
             </a:r>
           </a:p>
           <a:p>
             <a:pPr lvl="4"/>
             <a:r>
-              <a:rPr lang="en-US" smtClean="0"/>
+              <a:rPr lang="en-US"/>
               <a:t>Fifth level</a:t>
             </a:r>
-            <a:endParaRPr lang="en-US"/>
           </a:p>
         </p:txBody>
       </p:sp>
@@ -600,7 +594,7 @@
           <a:p>
             <a:fld id="{CBB88EEF-5DB1-4173-B392-01603F646A9C}" type="datetimeFigureOut">
               <a:rPr lang="en-US" smtClean="0"/>
-              <a:t>9/27/2018</a:t>
+              <a:t>10/6/2024</a:t>
             </a:fld>
             <a:endParaRPr lang="en-US"/>
           </a:p>
@@ -694,10 +688,9 @@
           <a:lstStyle/>
           <a:p>
             <a:r>
-              <a:rPr lang="en-US" smtClean="0"/>
+              <a:rPr lang="en-US"/>
               <a:t>Click to edit Master title style</a:t>
             </a:r>
-            <a:endParaRPr lang="en-US"/>
           </a:p>
         </p:txBody>
       </p:sp>
@@ -718,38 +711,37 @@
           <a:p>
             <a:pPr lvl="0"/>
             <a:r>
-              <a:rPr lang="en-US" smtClean="0"/>
+              <a:rPr lang="en-US"/>
               <a:t>Click to edit Master text styles</a:t>
             </a:r>
           </a:p>
           <a:p>
             <a:pPr lvl="1"/>
             <a:r>
-              <a:rPr lang="en-US" smtClean="0"/>
+              <a:rPr lang="en-US"/>
               <a:t>Second level</a:t>
             </a:r>
           </a:p>
           <a:p>
             <a:pPr lvl="2"/>
             <a:r>
-              <a:rPr lang="en-US" smtClean="0"/>
+              <a:rPr lang="en-US"/>
               <a:t>Third level</a:t>
             </a:r>
           </a:p>
           <a:p>
             <a:pPr lvl="3"/>
             <a:r>
-              <a:rPr lang="en-US" smtClean="0"/>
+              <a:rPr lang="en-US"/>
               <a:t>Fourth level</a:t>
             </a:r>
           </a:p>
           <a:p>
             <a:pPr lvl="4"/>
             <a:r>
-              <a:rPr lang="en-US" smtClean="0"/>
+              <a:rPr lang="en-US"/>
               <a:t>Fifth level</a:t>
             </a:r>
-            <a:endParaRPr lang="en-US"/>
           </a:p>
         </p:txBody>
       </p:sp>
@@ -770,7 +762,7 @@
           <a:p>
             <a:fld id="{CBB88EEF-5DB1-4173-B392-01603F646A9C}" type="datetimeFigureOut">
               <a:rPr lang="en-US" smtClean="0"/>
-              <a:t>9/27/2018</a:t>
+              <a:t>10/6/2024</a:t>
             </a:fld>
             <a:endParaRPr lang="en-US"/>
           </a:p>
@@ -873,10 +865,9 @@
           </a:lstStyle>
           <a:p>
             <a:r>
-              <a:rPr lang="en-US" smtClean="0"/>
+              <a:rPr lang="en-US"/>
               <a:t>Click to edit Master title style</a:t>
             </a:r>
-            <a:endParaRPr lang="en-US"/>
           </a:p>
         </p:txBody>
       </p:sp>
@@ -993,7 +984,7 @@
           <a:p>
             <a:pPr lvl="0"/>
             <a:r>
-              <a:rPr lang="en-US" smtClean="0"/>
+              <a:rPr lang="en-US"/>
               <a:t>Click to edit Master text styles</a:t>
             </a:r>
           </a:p>
@@ -1016,7 +1007,7 @@
           <a:p>
             <a:fld id="{CBB88EEF-5DB1-4173-B392-01603F646A9C}" type="datetimeFigureOut">
               <a:rPr lang="en-US" smtClean="0"/>
-              <a:t>9/27/2018</a:t>
+              <a:t>10/6/2024</a:t>
             </a:fld>
             <a:endParaRPr lang="en-US"/>
           </a:p>
@@ -1110,10 +1101,9 @@
           <a:lstStyle/>
           <a:p>
             <a:r>
-              <a:rPr lang="en-US" smtClean="0"/>
+              <a:rPr lang="en-US"/>
               <a:t>Click to edit Master title style</a:t>
             </a:r>
-            <a:endParaRPr lang="en-US"/>
           </a:p>
         </p:txBody>
       </p:sp>
@@ -1139,38 +1129,37 @@
           <a:p>
             <a:pPr lvl="0"/>
             <a:r>
-              <a:rPr lang="en-US" smtClean="0"/>
+              <a:rPr lang="en-US"/>
               <a:t>Click to edit Master text styles</a:t>
             </a:r>
           </a:p>
           <a:p>
             <a:pPr lvl="1"/>
             <a:r>
-              <a:rPr lang="en-US" smtClean="0"/>
+              <a:rPr lang="en-US"/>
               <a:t>Second level</a:t>
             </a:r>
           </a:p>
           <a:p>
             <a:pPr lvl="2"/>
             <a:r>
-              <a:rPr lang="en-US" smtClean="0"/>
+              <a:rPr lang="en-US"/>
               <a:t>Third level</a:t>
             </a:r>
           </a:p>
           <a:p>
             <a:pPr lvl="3"/>
             <a:r>
-              <a:rPr lang="en-US" smtClean="0"/>
+              <a:rPr lang="en-US"/>
               <a:t>Fourth level</a:t>
             </a:r>
           </a:p>
           <a:p>
             <a:pPr lvl="4"/>
             <a:r>
-              <a:rPr lang="en-US" smtClean="0"/>
+              <a:rPr lang="en-US"/>
               <a:t>Fifth level</a:t>
             </a:r>
-            <a:endParaRPr lang="en-US"/>
           </a:p>
         </p:txBody>
       </p:sp>
@@ -1196,38 +1185,37 @@
           <a:p>
             <a:pPr lvl="0"/>
             <a:r>
-              <a:rPr lang="en-US" smtClean="0"/>
+              <a:rPr lang="en-US"/>
               <a:t>Click to edit Master text styles</a:t>
             </a:r>
           </a:p>
           <a:p>
             <a:pPr lvl="1"/>
             <a:r>
-              <a:rPr lang="en-US" smtClean="0"/>
+              <a:rPr lang="en-US"/>
               <a:t>Second level</a:t>
             </a:r>
           </a:p>
           <a:p>
             <a:pPr lvl="2"/>
             <a:r>
-              <a:rPr lang="en-US" smtClean="0"/>
+              <a:rPr lang="en-US"/>
               <a:t>Third level</a:t>
             </a:r>
           </a:p>
           <a:p>
             <a:pPr lvl="3"/>
             <a:r>
-              <a:rPr lang="en-US" smtClean="0"/>
+              <a:rPr lang="en-US"/>
               <a:t>Fourth level</a:t>
             </a:r>
           </a:p>
           <a:p>
             <a:pPr lvl="4"/>
             <a:r>
-              <a:rPr lang="en-US" smtClean="0"/>
+              <a:rPr lang="en-US"/>
               <a:t>Fifth level</a:t>
             </a:r>
-            <a:endParaRPr lang="en-US"/>
           </a:p>
         </p:txBody>
       </p:sp>
@@ -1248,7 +1236,7 @@
           <a:p>
             <a:fld id="{CBB88EEF-5DB1-4173-B392-01603F646A9C}" type="datetimeFigureOut">
               <a:rPr lang="en-US" smtClean="0"/>
-              <a:t>9/27/2018</a:t>
+              <a:t>10/6/2024</a:t>
             </a:fld>
             <a:endParaRPr lang="en-US"/>
           </a:p>
@@ -1347,10 +1335,9 @@
           <a:lstStyle/>
           <a:p>
             <a:r>
-              <a:rPr lang="en-US" smtClean="0"/>
+              <a:rPr lang="en-US"/>
               <a:t>Click to edit Master title style</a:t>
             </a:r>
-            <a:endParaRPr lang="en-US"/>
           </a:p>
         </p:txBody>
       </p:sp>
@@ -1413,7 +1400,7 @@
           <a:p>
             <a:pPr lvl="0"/>
             <a:r>
-              <a:rPr lang="en-US" smtClean="0"/>
+              <a:rPr lang="en-US"/>
               <a:t>Click to edit Master text styles</a:t>
             </a:r>
           </a:p>
@@ -1441,38 +1428,37 @@
           <a:p>
             <a:pPr lvl="0"/>
             <a:r>
-              <a:rPr lang="en-US" smtClean="0"/>
+              <a:rPr lang="en-US"/>
               <a:t>Click to edit Master text styles</a:t>
             </a:r>
           </a:p>
           <a:p>
             <a:pPr lvl="1"/>
             <a:r>
-              <a:rPr lang="en-US" smtClean="0"/>
+              <a:rPr lang="en-US"/>
               <a:t>Second level</a:t>
             </a:r>
           </a:p>
           <a:p>
             <a:pPr lvl="2"/>
             <a:r>
-              <a:rPr lang="en-US" smtClean="0"/>
+              <a:rPr lang="en-US"/>
               <a:t>Third level</a:t>
             </a:r>
           </a:p>
           <a:p>
             <a:pPr lvl="3"/>
             <a:r>
-              <a:rPr lang="en-US" smtClean="0"/>
+              <a:rPr lang="en-US"/>
               <a:t>Fourth level</a:t>
             </a:r>
           </a:p>
           <a:p>
             <a:pPr lvl="4"/>
             <a:r>
-              <a:rPr lang="en-US" smtClean="0"/>
+              <a:rPr lang="en-US"/>
               <a:t>Fifth level</a:t>
             </a:r>
-            <a:endParaRPr lang="en-US"/>
           </a:p>
         </p:txBody>
       </p:sp>
@@ -1535,7 +1521,7 @@
           <a:p>
             <a:pPr lvl="0"/>
             <a:r>
-              <a:rPr lang="en-US" smtClean="0"/>
+              <a:rPr lang="en-US"/>
               <a:t>Click to edit Master text styles</a:t>
             </a:r>
           </a:p>
@@ -1563,38 +1549,37 @@
           <a:p>
             <a:pPr lvl="0"/>
             <a:r>
-              <a:rPr lang="en-US" smtClean="0"/>
+              <a:rPr lang="en-US"/>
               <a:t>Click to edit Master text styles</a:t>
             </a:r>
           </a:p>
           <a:p>
             <a:pPr lvl="1"/>
             <a:r>
-              <a:rPr lang="en-US" smtClean="0"/>
+              <a:rPr lang="en-US"/>
               <a:t>Second level</a:t>
             </a:r>
           </a:p>
           <a:p>
             <a:pPr lvl="2"/>
             <a:r>
-              <a:rPr lang="en-US" smtClean="0"/>
+              <a:rPr lang="en-US"/>
               <a:t>Third level</a:t>
             </a:r>
           </a:p>
           <a:p>
             <a:pPr lvl="3"/>
             <a:r>
-              <a:rPr lang="en-US" smtClean="0"/>
+              <a:rPr lang="en-US"/>
               <a:t>Fourth level</a:t>
             </a:r>
           </a:p>
           <a:p>
             <a:pPr lvl="4"/>
             <a:r>
-              <a:rPr lang="en-US" smtClean="0"/>
+              <a:rPr lang="en-US"/>
               <a:t>Fifth level</a:t>
             </a:r>
-            <a:endParaRPr lang="en-US"/>
           </a:p>
         </p:txBody>
       </p:sp>
@@ -1615,7 +1600,7 @@
           <a:p>
             <a:fld id="{CBB88EEF-5DB1-4173-B392-01603F646A9C}" type="datetimeFigureOut">
               <a:rPr lang="en-US" smtClean="0"/>
-              <a:t>9/27/2018</a:t>
+              <a:t>10/6/2024</a:t>
             </a:fld>
             <a:endParaRPr lang="en-US"/>
           </a:p>
@@ -1709,10 +1694,9 @@
           <a:lstStyle/>
           <a:p>
             <a:r>
-              <a:rPr lang="en-US" smtClean="0"/>
+              <a:rPr lang="en-US"/>
               <a:t>Click to edit Master title style</a:t>
             </a:r>
-            <a:endParaRPr lang="en-US"/>
           </a:p>
         </p:txBody>
       </p:sp>
@@ -1733,7 +1717,7 @@
           <a:p>
             <a:fld id="{CBB88EEF-5DB1-4173-B392-01603F646A9C}" type="datetimeFigureOut">
               <a:rPr lang="en-US" smtClean="0"/>
-              <a:t>9/27/2018</a:t>
+              <a:t>10/6/2024</a:t>
             </a:fld>
             <a:endParaRPr lang="en-US"/>
           </a:p>
@@ -1828,7 +1812,7 @@
           <a:p>
             <a:fld id="{CBB88EEF-5DB1-4173-B392-01603F646A9C}" type="datetimeFigureOut">
               <a:rPr lang="en-US" smtClean="0"/>
-              <a:t>9/27/2018</a:t>
+              <a:t>10/6/2024</a:t>
             </a:fld>
             <a:endParaRPr lang="en-US"/>
           </a:p>
@@ -1931,10 +1915,9 @@
           </a:lstStyle>
           <a:p>
             <a:r>
-              <a:rPr lang="en-US" smtClean="0"/>
+              <a:rPr lang="en-US"/>
               <a:t>Click to edit Master title style</a:t>
             </a:r>
-            <a:endParaRPr lang="en-US"/>
           </a:p>
         </p:txBody>
       </p:sp>
@@ -1988,38 +1971,37 @@
           <a:p>
             <a:pPr lvl="0"/>
             <a:r>
-              <a:rPr lang="en-US" smtClean="0"/>
+              <a:rPr lang="en-US"/>
               <a:t>Click to edit Master text styles</a:t>
             </a:r>
           </a:p>
           <a:p>
             <a:pPr lvl="1"/>
             <a:r>
-              <a:rPr lang="en-US" smtClean="0"/>
+              <a:rPr lang="en-US"/>
               <a:t>Second level</a:t>
             </a:r>
           </a:p>
           <a:p>
             <a:pPr lvl="2"/>
             <a:r>
-              <a:rPr lang="en-US" smtClean="0"/>
+              <a:rPr lang="en-US"/>
               <a:t>Third level</a:t>
             </a:r>
           </a:p>
           <a:p>
             <a:pPr lvl="3"/>
             <a:r>
-              <a:rPr lang="en-US" smtClean="0"/>
+              <a:rPr lang="en-US"/>
               <a:t>Fourth level</a:t>
             </a:r>
           </a:p>
           <a:p>
             <a:pPr lvl="4"/>
             <a:r>
-              <a:rPr lang="en-US" smtClean="0"/>
+              <a:rPr lang="en-US"/>
               <a:t>Fifth level</a:t>
             </a:r>
-            <a:endParaRPr lang="en-US"/>
           </a:p>
         </p:txBody>
       </p:sp>
@@ -2082,7 +2064,7 @@
           <a:p>
             <a:pPr lvl="0"/>
             <a:r>
-              <a:rPr lang="en-US" smtClean="0"/>
+              <a:rPr lang="en-US"/>
               <a:t>Click to edit Master text styles</a:t>
             </a:r>
           </a:p>
@@ -2105,7 +2087,7 @@
           <a:p>
             <a:fld id="{CBB88EEF-5DB1-4173-B392-01603F646A9C}" type="datetimeFigureOut">
               <a:rPr lang="en-US" smtClean="0"/>
-              <a:t>9/27/2018</a:t>
+              <a:t>10/6/2024</a:t>
             </a:fld>
             <a:endParaRPr lang="en-US"/>
           </a:p>
@@ -2208,10 +2190,9 @@
           </a:lstStyle>
           <a:p>
             <a:r>
-              <a:rPr lang="en-US" smtClean="0"/>
+              <a:rPr lang="en-US"/>
               <a:t>Click to edit Master title style</a:t>
             </a:r>
-            <a:endParaRPr lang="en-US"/>
           </a:p>
         </p:txBody>
       </p:sp>
@@ -2335,7 +2316,7 @@
           <a:p>
             <a:pPr lvl="0"/>
             <a:r>
-              <a:rPr lang="en-US" smtClean="0"/>
+              <a:rPr lang="en-US"/>
               <a:t>Click to edit Master text styles</a:t>
             </a:r>
           </a:p>
@@ -2358,7 +2339,7 @@
           <a:p>
             <a:fld id="{CBB88EEF-5DB1-4173-B392-01603F646A9C}" type="datetimeFigureOut">
               <a:rPr lang="en-US" smtClean="0"/>
-              <a:t>9/27/2018</a:t>
+              <a:t>10/6/2024</a:t>
             </a:fld>
             <a:endParaRPr lang="en-US"/>
           </a:p>
@@ -2467,10 +2448,9 @@
           <a:lstStyle/>
           <a:p>
             <a:r>
-              <a:rPr lang="en-US" smtClean="0"/>
+              <a:rPr lang="en-US"/>
               <a:t>Click to edit Master title style</a:t>
             </a:r>
-            <a:endParaRPr lang="en-US"/>
           </a:p>
         </p:txBody>
       </p:sp>
@@ -2501,38 +2481,37 @@
           <a:p>
             <a:pPr lvl="0"/>
             <a:r>
-              <a:rPr lang="en-US" smtClean="0"/>
+              <a:rPr lang="en-US"/>
               <a:t>Click to edit Master text styles</a:t>
             </a:r>
           </a:p>
           <a:p>
             <a:pPr lvl="1"/>
             <a:r>
-              <a:rPr lang="en-US" smtClean="0"/>
+              <a:rPr lang="en-US"/>
               <a:t>Second level</a:t>
             </a:r>
           </a:p>
           <a:p>
             <a:pPr lvl="2"/>
             <a:r>
-              <a:rPr lang="en-US" smtClean="0"/>
+              <a:rPr lang="en-US"/>
               <a:t>Third level</a:t>
             </a:r>
           </a:p>
           <a:p>
             <a:pPr lvl="3"/>
             <a:r>
-              <a:rPr lang="en-US" smtClean="0"/>
+              <a:rPr lang="en-US"/>
               <a:t>Fourth level</a:t>
             </a:r>
           </a:p>
           <a:p>
             <a:pPr lvl="4"/>
             <a:r>
-              <a:rPr lang="en-US" smtClean="0"/>
+              <a:rPr lang="en-US"/>
               <a:t>Fifth level</a:t>
             </a:r>
-            <a:endParaRPr lang="en-US"/>
           </a:p>
         </p:txBody>
       </p:sp>
@@ -2571,7 +2550,7 @@
           <a:p>
             <a:fld id="{CBB88EEF-5DB1-4173-B392-01603F646A9C}" type="datetimeFigureOut">
               <a:rPr lang="en-US" smtClean="0"/>
-              <a:t>9/27/2018</a:t>
+              <a:t>10/6/2024</a:t>
             </a:fld>
             <a:endParaRPr lang="en-US"/>
           </a:p>
@@ -2992,10 +2971,9 @@
           <a:lstStyle/>
           <a:p>
             <a:r>
-              <a:rPr lang="en-US" dirty="0" smtClean="0"/>
+              <a:rPr lang="en-US" dirty="0"/>
               <a:t>Software Testing</a:t>
             </a:r>
-            <a:endParaRPr lang="en-US" dirty="0"/>
           </a:p>
         </p:txBody>
       </p:sp>
@@ -3015,16 +2993,15 @@
           <a:lstStyle/>
           <a:p>
             <a:r>
-              <a:rPr lang="en-US" dirty="0" smtClean="0"/>
+              <a:rPr lang="en-US" dirty="0"/>
               <a:t>For CSE 3902</a:t>
             </a:r>
           </a:p>
           <a:p>
             <a:r>
-              <a:rPr lang="en-US" dirty="0" smtClean="0"/>
+              <a:rPr lang="en-US" dirty="0"/>
               <a:t>Updated by Neil Kirby</a:t>
             </a:r>
-            <a:endParaRPr lang="en-US" dirty="0" smtClean="0"/>
           </a:p>
         </p:txBody>
       </p:sp>
@@ -3074,57 +3051,55 @@
           <a:lstStyle/>
           <a:p>
             <a:r>
-              <a:rPr lang="en-US" dirty="0" smtClean="0"/>
+              <a:rPr lang="en-US" dirty="0"/>
               <a:t>Why Test?</a:t>
             </a:r>
+          </a:p>
+        </p:txBody>
+      </p:sp>
+      <p:sp>
+        <p:nvSpPr>
+          <p:cNvPr id="3" name="Content Placeholder 2"/>
+          <p:cNvSpPr>
+            <a:spLocks noGrp="1"/>
+          </p:cNvSpPr>
+          <p:nvPr>
+            <p:ph idx="1"/>
+          </p:nvPr>
+        </p:nvSpPr>
+        <p:spPr/>
+        <p:txBody>
+          <a:bodyPr/>
+          <a:lstStyle/>
+          <a:p>
+            <a:r>
+              <a:rPr lang="en-US" dirty="0"/>
+              <a:t>You can’t “test in quality.”</a:t>
+            </a:r>
+          </a:p>
+          <a:p>
+            <a:pPr lvl="1"/>
+            <a:r>
+              <a:rPr lang="en-US" dirty="0"/>
+              <a:t>But you can test to get an idea about quality</a:t>
+            </a:r>
+          </a:p>
+          <a:p>
+            <a:pPr lvl="1"/>
             <a:endParaRPr lang="en-US" dirty="0"/>
           </a:p>
-        </p:txBody>
-      </p:sp>
-      <p:sp>
-        <p:nvSpPr>
-          <p:cNvPr id="3" name="Content Placeholder 2"/>
-          <p:cNvSpPr>
-            <a:spLocks noGrp="1"/>
-          </p:cNvSpPr>
-          <p:nvPr>
-            <p:ph idx="1"/>
-          </p:nvPr>
-        </p:nvSpPr>
-        <p:spPr/>
-        <p:txBody>
-          <a:bodyPr/>
-          <a:lstStyle/>
-          <a:p>
-            <a:r>
-              <a:rPr lang="en-US" dirty="0" smtClean="0"/>
-              <a:t>You can’t “test in quality.”</a:t>
+          <a:p>
+            <a:r>
+              <a:rPr lang="en-US" dirty="0"/>
+              <a:t>You know you don’t always write perfect code</a:t>
             </a:r>
           </a:p>
           <a:p>
             <a:pPr lvl="1"/>
             <a:r>
-              <a:rPr lang="en-US" dirty="0" smtClean="0"/>
-              <a:t>But you can test to get an idea about quality</a:t>
-            </a:r>
-          </a:p>
-          <a:p>
-            <a:pPr lvl="1"/>
-            <a:endParaRPr lang="en-US" dirty="0" smtClean="0"/>
-          </a:p>
-          <a:p>
-            <a:r>
-              <a:rPr lang="en-US" dirty="0" smtClean="0"/>
-              <a:t>You know you don’t always write perfect code</a:t>
-            </a:r>
-          </a:p>
-          <a:p>
-            <a:pPr lvl="1"/>
-            <a:r>
-              <a:rPr lang="en-US" dirty="0" smtClean="0"/>
+              <a:rPr lang="en-US" dirty="0"/>
               <a:t>But you know that what you tested works</a:t>
             </a:r>
-            <a:endParaRPr lang="en-US" dirty="0"/>
           </a:p>
         </p:txBody>
       </p:sp>
@@ -3174,10 +3149,9 @@
           <a:lstStyle/>
           <a:p>
             <a:r>
-              <a:rPr lang="en-US" dirty="0" smtClean="0"/>
+              <a:rPr lang="en-US" dirty="0"/>
               <a:t>Terms: Setup / Exercise / Verify / Teardown</a:t>
             </a:r>
-            <a:endParaRPr lang="en-US" dirty="0"/>
           </a:p>
         </p:txBody>
       </p:sp>
@@ -3197,58 +3171,58 @@
           <a:lstStyle/>
           <a:p>
             <a:r>
-              <a:rPr lang="en-US" b="1" dirty="0" smtClean="0"/>
+              <a:rPr lang="en-US" b="1" dirty="0"/>
               <a:t>Setup</a:t>
             </a:r>
             <a:r>
-              <a:rPr lang="en-US" dirty="0" smtClean="0"/>
+              <a:rPr lang="en-US" dirty="0"/>
               <a:t> - whatever needs to be prepared before the code can be run</a:t>
             </a:r>
           </a:p>
           <a:p>
-            <a:endParaRPr lang="en-US" b="1" dirty="0" smtClean="0"/>
-          </a:p>
-          <a:p>
-            <a:r>
-              <a:rPr lang="en-US" b="1" dirty="0" smtClean="0"/>
+            <a:endParaRPr lang="en-US" b="1" dirty="0"/>
+          </a:p>
+          <a:p>
+            <a:r>
+              <a:rPr lang="en-US" b="1" dirty="0"/>
               <a:t>Exercise</a:t>
             </a:r>
             <a:r>
-              <a:rPr lang="en-US" dirty="0" smtClean="0"/>
+              <a:rPr lang="en-US" dirty="0"/>
               <a:t> - run the code we want to test</a:t>
             </a:r>
           </a:p>
           <a:p>
-            <a:endParaRPr lang="en-US" b="1" dirty="0" smtClean="0"/>
-          </a:p>
-          <a:p>
-            <a:r>
-              <a:rPr lang="en-US" b="1" dirty="0" smtClean="0"/>
+            <a:endParaRPr lang="en-US" b="1" dirty="0"/>
+          </a:p>
+          <a:p>
+            <a:r>
+              <a:rPr lang="en-US" b="1" dirty="0"/>
               <a:t>Verify</a:t>
             </a:r>
             <a:r>
-              <a:rPr lang="en-US" dirty="0" smtClean="0"/>
+              <a:rPr lang="en-US" dirty="0"/>
               <a:t> - compare the result of the run with some expected condition</a:t>
             </a:r>
           </a:p>
           <a:p>
-            <a:endParaRPr lang="en-US" b="1" dirty="0" smtClean="0"/>
-          </a:p>
-          <a:p>
-            <a:r>
-              <a:rPr lang="en-US" b="1" dirty="0" smtClean="0"/>
+            <a:endParaRPr lang="en-US" b="1" dirty="0"/>
+          </a:p>
+          <a:p>
+            <a:r>
+              <a:rPr lang="en-US" b="1" dirty="0"/>
               <a:t>Teardown</a:t>
             </a:r>
             <a:r>
-              <a:rPr lang="en-US" dirty="0" smtClean="0"/>
+              <a:rPr lang="en-US" dirty="0"/>
               <a:t> - cleanup all the extra stuff we used for testing so that the system is in the same state as it was before we started the current test (the state from before the </a:t>
             </a:r>
             <a:r>
-              <a:rPr lang="en-US" i="1" dirty="0" smtClean="0"/>
+              <a:rPr lang="en-US" i="1" dirty="0"/>
               <a:t>Setup</a:t>
             </a:r>
             <a:r>
-              <a:rPr lang="en-US" dirty="0" smtClean="0"/>
+              <a:rPr lang="en-US" dirty="0"/>
               <a:t> step).</a:t>
             </a:r>
           </a:p>
@@ -3306,10 +3280,9 @@
           <a:lstStyle/>
           <a:p>
             <a:r>
-              <a:rPr lang="en-US" dirty="0" smtClean="0"/>
+              <a:rPr lang="en-US" dirty="0"/>
               <a:t>Terms: code coverage</a:t>
             </a:r>
-            <a:endParaRPr lang="en-US" dirty="0"/>
           </a:p>
         </p:txBody>
       </p:sp>
@@ -3331,13 +3304,13 @@
           <a:lstStyle/>
           <a:p>
             <a:r>
-              <a:rPr lang="en-US" b="1" dirty="0" smtClean="0">
+              <a:rPr lang="en-US" b="1" dirty="0">
                 <a:effectLst/>
               </a:rPr>
               <a:t>Function coverage</a:t>
             </a:r>
             <a:r>
-              <a:rPr lang="en-US" dirty="0" smtClean="0">
+              <a:rPr lang="en-US" dirty="0">
                 <a:effectLst/>
               </a:rPr>
               <a:t> - Has each function been called?</a:t>
@@ -3345,13 +3318,13 @@
           </a:p>
           <a:p>
             <a:r>
-              <a:rPr lang="en-US" b="1" dirty="0" smtClean="0">
+              <a:rPr lang="en-US" b="1" dirty="0">
                 <a:effectLst/>
               </a:rPr>
               <a:t>Statement coverage</a:t>
             </a:r>
             <a:r>
-              <a:rPr lang="en-US" dirty="0" smtClean="0">
+              <a:rPr lang="en-US" dirty="0">
                 <a:effectLst/>
               </a:rPr>
               <a:t> - Has each statement been executed?</a:t>
@@ -3359,13 +3332,13 @@
           </a:p>
           <a:p>
             <a:r>
-              <a:rPr lang="en-US" b="1" dirty="0" smtClean="0">
+              <a:rPr lang="en-US" b="1" dirty="0">
                 <a:effectLst/>
               </a:rPr>
               <a:t>Branch coverage</a:t>
             </a:r>
             <a:r>
-              <a:rPr lang="en-US" dirty="0" smtClean="0">
+              <a:rPr lang="en-US" dirty="0">
                 <a:effectLst/>
               </a:rPr>
               <a:t> - Has each branch (i.e. if-else blocks or cases of a switch) been executed?</a:t>
@@ -3373,13 +3346,13 @@
           </a:p>
           <a:p>
             <a:r>
-              <a:rPr lang="en-US" b="1" dirty="0" smtClean="0">
+              <a:rPr lang="en-US" b="1" dirty="0">
                 <a:effectLst/>
               </a:rPr>
               <a:t>Path coverage</a:t>
             </a:r>
             <a:r>
-              <a:rPr lang="en-US" dirty="0" smtClean="0">
+              <a:rPr lang="en-US" dirty="0">
                 <a:effectLst/>
               </a:rPr>
               <a:t> - Has every possible route through a given part of the code been executed? </a:t>
@@ -3387,13 +3360,13 @@
           </a:p>
           <a:p>
             <a:r>
-              <a:rPr lang="en-US" b="1" dirty="0" smtClean="0">
+              <a:rPr lang="en-US" b="1" dirty="0">
                 <a:effectLst/>
               </a:rPr>
               <a:t>Loop coverage</a:t>
             </a:r>
             <a:r>
-              <a:rPr lang="en-US" dirty="0" smtClean="0">
+              <a:rPr lang="en-US" dirty="0">
                 <a:effectLst/>
               </a:rPr>
               <a:t> - Has every possible loop been executed zero times, once, and more than once?</a:t>
@@ -3401,20 +3374,20 @@
           </a:p>
           <a:p>
             <a:r>
-              <a:rPr lang="en-US" b="1" dirty="0" smtClean="0">
+              <a:rPr lang="en-US" b="1" dirty="0">
                 <a:effectLst/>
               </a:rPr>
               <a:t>State coverage</a:t>
             </a:r>
             <a:r>
-              <a:rPr lang="en-US" dirty="0" smtClean="0">
+              <a:rPr lang="en-US" dirty="0">
                 <a:effectLst/>
               </a:rPr>
               <a:t> - Has each state in a finite-state machine been reached and explored?</a:t>
             </a:r>
           </a:p>
           <a:p>
-            <a:endParaRPr lang="en-US" dirty="0" smtClean="0">
+            <a:endParaRPr lang="en-US" dirty="0">
               <a:effectLst/>
             </a:endParaRPr>
           </a:p>
@@ -3469,10 +3442,9 @@
           <a:lstStyle/>
           <a:p>
             <a:r>
-              <a:rPr lang="en-US" dirty="0" smtClean="0"/>
+              <a:rPr lang="en-US" dirty="0"/>
               <a:t>That sounds familiar… </a:t>
             </a:r>
-            <a:endParaRPr lang="en-US" dirty="0"/>
           </a:p>
         </p:txBody>
       </p:sp>
@@ -3492,10 +3464,9 @@
           <a:lstStyle/>
           <a:p>
             <a:r>
-              <a:rPr lang="en-US" dirty="0" smtClean="0"/>
+              <a:rPr lang="en-US" dirty="0"/>
               <a:t>Code coverage (see previous slide) is closely related to one of our software metrics – which one?</a:t>
             </a:r>
-            <a:endParaRPr lang="en-US" dirty="0"/>
           </a:p>
         </p:txBody>
       </p:sp>
@@ -3545,33 +3516,32 @@
           <a:lstStyle/>
           <a:p>
             <a:r>
-              <a:rPr lang="en-US" dirty="0" smtClean="0"/>
+              <a:rPr lang="en-US" dirty="0"/>
               <a:t>Test Driven Development</a:t>
             </a:r>
+          </a:p>
+        </p:txBody>
+      </p:sp>
+      <p:sp>
+        <p:nvSpPr>
+          <p:cNvPr id="3" name="Content Placeholder 2"/>
+          <p:cNvSpPr>
+            <a:spLocks noGrp="1"/>
+          </p:cNvSpPr>
+          <p:nvPr>
+            <p:ph idx="1"/>
+          </p:nvPr>
+        </p:nvSpPr>
+        <p:spPr/>
+        <p:txBody>
+          <a:bodyPr/>
+          <a:lstStyle/>
+          <a:p>
             <a:endParaRPr lang="en-US" dirty="0"/>
           </a:p>
-        </p:txBody>
-      </p:sp>
-      <p:sp>
-        <p:nvSpPr>
-          <p:cNvPr id="3" name="Content Placeholder 2"/>
-          <p:cNvSpPr>
-            <a:spLocks noGrp="1"/>
-          </p:cNvSpPr>
-          <p:nvPr>
-            <p:ph idx="1"/>
-          </p:nvPr>
-        </p:nvSpPr>
-        <p:spPr/>
-        <p:txBody>
-          <a:bodyPr/>
-          <a:lstStyle/>
-          <a:p>
-            <a:endParaRPr lang="en-US" dirty="0" smtClean="0"/>
-          </a:p>
-          <a:p>
-            <a:r>
-              <a:rPr lang="en-US" dirty="0" smtClean="0"/>
+          <a:p>
+            <a:r>
+              <a:rPr lang="en-US" dirty="0"/>
               <a:t>Write tests first</a:t>
             </a:r>
           </a:p>
@@ -3580,7 +3550,7 @@
           </a:p>
           <a:p>
             <a:r>
-              <a:rPr lang="en-US" dirty="0" smtClean="0"/>
+              <a:rPr lang="en-US" dirty="0"/>
               <a:t>Write minimal amount of code to pass the test</a:t>
             </a:r>
           </a:p>
@@ -3589,10 +3559,9 @@
           </a:p>
           <a:p>
             <a:r>
-              <a:rPr lang="en-US" dirty="0" smtClean="0"/>
+              <a:rPr lang="en-US" dirty="0"/>
               <a:t>Refactor code to fit quality standards</a:t>
             </a:r>
-            <a:endParaRPr lang="en-US" dirty="0"/>
           </a:p>
         </p:txBody>
       </p:sp>
@@ -3642,10 +3611,9 @@
           <a:lstStyle/>
           <a:p>
             <a:r>
-              <a:rPr lang="en-US" dirty="0" smtClean="0"/>
+              <a:rPr lang="en-US" dirty="0"/>
               <a:t>Mutation testing</a:t>
             </a:r>
-            <a:endParaRPr lang="en-US" dirty="0"/>
           </a:p>
         </p:txBody>
       </p:sp>
@@ -3667,61 +3635,61 @@
           <a:lstStyle/>
           <a:p>
             <a:r>
-              <a:rPr lang="en-US" dirty="0" smtClean="0"/>
+              <a:rPr lang="en-US" dirty="0"/>
               <a:t>Given an existing implementation and set of unit tests</a:t>
             </a:r>
           </a:p>
           <a:p>
             <a:r>
-              <a:rPr lang="en-US" dirty="0" smtClean="0"/>
+              <a:rPr lang="en-US" dirty="0"/>
               <a:t>Modify/Mutate one statement in existing code, ex:</a:t>
             </a:r>
           </a:p>
           <a:p>
             <a:pPr lvl="1"/>
             <a:r>
-              <a:rPr lang="en-US" dirty="0" smtClean="0"/>
+              <a:rPr lang="en-US" dirty="0"/>
               <a:t>Arithmetic operators:  + becomes a –</a:t>
             </a:r>
           </a:p>
           <a:p>
             <a:pPr lvl="1"/>
             <a:r>
-              <a:rPr lang="en-US" dirty="0" smtClean="0"/>
+              <a:rPr lang="en-US" dirty="0"/>
               <a:t>Boolean operators:  &lt; becomes a &lt;=</a:t>
             </a:r>
           </a:p>
           <a:p>
             <a:pPr lvl="1"/>
             <a:r>
-              <a:rPr lang="en-US" dirty="0" smtClean="0"/>
+              <a:rPr lang="en-US" dirty="0"/>
               <a:t>Values: numeric literal or constant is increased or decreased by 1</a:t>
             </a:r>
           </a:p>
           <a:p>
             <a:pPr lvl="1"/>
             <a:r>
-              <a:rPr lang="en-US" dirty="0" smtClean="0"/>
+              <a:rPr lang="en-US" dirty="0"/>
               <a:t>Adding or removing statements</a:t>
             </a:r>
           </a:p>
           <a:p>
             <a:r>
-              <a:rPr lang="en-US" dirty="0" smtClean="0"/>
+              <a:rPr lang="en-US" dirty="0"/>
               <a:t>Generate X mutant code samples and run unit tests</a:t>
             </a:r>
           </a:p>
           <a:p>
             <a:pPr lvl="1"/>
             <a:r>
-              <a:rPr lang="en-US" dirty="0" smtClean="0"/>
+              <a:rPr lang="en-US" dirty="0"/>
               <a:t>If one of the tests fails the mutant has been “killed”</a:t>
             </a:r>
           </a:p>
           <a:p>
             <a:pPr lvl="1"/>
             <a:r>
-              <a:rPr lang="en-US" dirty="0" smtClean="0"/>
+              <a:rPr lang="en-US" dirty="0"/>
               <a:t>Killed mutants / total mutants measures usefulness of current unit tests</a:t>
             </a:r>
           </a:p>
@@ -3773,10 +3741,9 @@
           <a:lstStyle/>
           <a:p>
             <a:r>
-              <a:rPr lang="en-US" dirty="0" smtClean="0"/>
+              <a:rPr lang="en-US" dirty="0"/>
               <a:t>Testing Anti-patterns</a:t>
             </a:r>
-            <a:endParaRPr lang="en-US" dirty="0"/>
           </a:p>
         </p:txBody>
       </p:sp>
@@ -3793,12 +3760,12 @@
         <p:spPr/>
         <p:txBody>
           <a:bodyPr>
-            <a:normAutofit lnSpcReduction="10000"/>
+            <a:normAutofit fontScale="92500"/>
           </a:bodyPr>
           <a:lstStyle/>
           <a:p>
             <a:r>
-              <a:rPr lang="en-US" dirty="0" smtClean="0">
+              <a:rPr lang="en-US" dirty="0">
                 <a:effectLst/>
               </a:rPr>
               <a:t>Having dependencies between test cases</a:t>
@@ -3807,29 +3774,29 @@
           <a:p>
             <a:pPr lvl="1"/>
             <a:r>
-              <a:rPr lang="en-US" dirty="0" smtClean="0"/>
+              <a:rPr lang="en-US" dirty="0"/>
               <a:t>Order that tests are executed shouldn’t matter</a:t>
             </a:r>
           </a:p>
           <a:p>
             <a:pPr lvl="1"/>
             <a:r>
-              <a:rPr lang="en-US" dirty="0" smtClean="0">
+              <a:rPr lang="en-US" dirty="0">
                 <a:effectLst/>
               </a:rPr>
               <a:t>Failing on one test should not affect </a:t>
             </a:r>
             <a:r>
-              <a:rPr lang="en-US" dirty="0" smtClean="0"/>
+              <a:rPr lang="en-US" dirty="0"/>
               <a:t>the pass/fail of the next test</a:t>
             </a:r>
-            <a:endParaRPr lang="en-US" dirty="0" smtClean="0">
+            <a:endParaRPr lang="en-US" dirty="0">
               <a:effectLst/>
             </a:endParaRPr>
           </a:p>
           <a:p>
             <a:r>
-              <a:rPr lang="en-US" dirty="0" smtClean="0">
+              <a:rPr lang="en-US" dirty="0">
                 <a:effectLst/>
               </a:rPr>
               <a:t>Testing for run-time speed/performance</a:t>
@@ -3837,7 +3804,7 @@
           </a:p>
           <a:p>
             <a:r>
-              <a:rPr lang="en-US" dirty="0" smtClean="0">
+              <a:rPr lang="en-US" dirty="0">
                 <a:effectLst/>
               </a:rPr>
               <a:t>Slow running tests</a:t>
@@ -3845,13 +3812,13 @@
           </a:p>
           <a:p>
             <a:r>
-              <a:rPr lang="en-US" dirty="0" smtClean="0"/>
+              <a:rPr lang="en-US" dirty="0"/>
               <a:t>Over specification – starting conditions are too constrained</a:t>
             </a:r>
           </a:p>
           <a:p>
             <a:r>
-              <a:rPr lang="en-US" dirty="0" smtClean="0">
+              <a:rPr lang="en-US" dirty="0">
                 <a:effectLst/>
               </a:rPr>
               <a:t>Under specification – starting conditions are not constrained enough</a:t>
@@ -3859,41 +3826,47 @@
           </a:p>
           <a:p>
             <a:r>
-              <a:rPr lang="en-US" dirty="0" smtClean="0"/>
+              <a:rPr lang="en-US" dirty="0"/>
               <a:t>The </a:t>
             </a:r>
             <a:r>
-              <a:rPr lang="en-US" dirty="0" smtClean="0">
+              <a:rPr lang="en-US" dirty="0">
                 <a:hlinkClick r:id="rId2"/>
               </a:rPr>
-              <a:t>ice cream cone</a:t>
-            </a:r>
-            <a:r>
-              <a:rPr lang="en-US" dirty="0" smtClean="0"/>
-              <a:t> and </a:t>
-            </a:r>
-            <a:r>
-              <a:rPr lang="en-US" dirty="0" smtClean="0">
+              <a:t>ice cream cone </a:t>
+            </a:r>
+            <a:r>
+              <a:rPr lang="en-US" dirty="0"/>
+              <a:t>and </a:t>
+            </a:r>
+            <a:r>
+              <a:rPr lang="en-US" dirty="0">
                 <a:hlinkClick r:id="rId3"/>
               </a:rPr>
               <a:t>cupcake</a:t>
             </a:r>
             <a:r>
-              <a:rPr lang="en-US" dirty="0" smtClean="0"/>
-              <a:t> – too much reliance on manual testing</a:t>
-            </a:r>
-            <a:r>
-              <a:rPr lang="en-US" dirty="0" smtClean="0">
-                <a:effectLst/>
-              </a:rPr>
-              <a:t/>
+              <a:rPr lang="en-US" dirty="0"/>
+              <a:t> – too much reliance on </a:t>
+            </a:r>
+            <a:r>
+              <a:rPr lang="en-US"/>
+              <a:t>manual testing -  </a:t>
+            </a:r>
+            <a:r>
+              <a:rPr lang="en-US" dirty="0"/>
+              <a:t>(Feel free to Google “ice cream cone software </a:t>
+            </a:r>
+            <a:r>
+              <a:rPr lang="en-US"/>
+              <a:t>testing antipattern”)</a:t>
             </a:r>
             <a:br>
-              <a:rPr lang="en-US" dirty="0" smtClean="0">
+              <a:rPr lang="en-US" dirty="0">
                 <a:effectLst/>
               </a:rPr>
             </a:br>
-            <a:endParaRPr lang="en-US" dirty="0" smtClean="0">
+            <a:endParaRPr lang="en-US" dirty="0">
               <a:effectLst/>
             </a:endParaRPr>
           </a:p>

</xml_diff>